<commit_message>
update presentation with Firebase printscreens and application flows: registration, encryption, decryption
</commit_message>
<xml_diff>
--- a/BS_WebApp.pptx
+++ b/BS_WebApp.pptx
@@ -5,7 +5,7 @@
     <p:sldMasterId id="2147484374" r:id="rId1"/>
   </p:sldMasterIdLst>
   <p:notesMasterIdLst>
-    <p:notesMasterId r:id="rId13"/>
+    <p:notesMasterId r:id="rId16"/>
   </p:notesMasterIdLst>
   <p:sldIdLst>
     <p:sldId id="256" r:id="rId2"/>
@@ -18,7 +18,10 @@
     <p:sldId id="263" r:id="rId9"/>
     <p:sldId id="264" r:id="rId10"/>
     <p:sldId id="265" r:id="rId11"/>
-    <p:sldId id="266" r:id="rId12"/>
+    <p:sldId id="267" r:id="rId12"/>
+    <p:sldId id="268" r:id="rId13"/>
+    <p:sldId id="269" r:id="rId14"/>
+    <p:sldId id="266" r:id="rId15"/>
   </p:sldIdLst>
   <p:sldSz cx="12192000" cy="6858000"/>
   <p:notesSz cx="6858000" cy="9144000"/>
@@ -117,6 +120,11 @@
       </a:defRPr>
     </a:lvl9pPr>
   </p:defaultTextStyle>
+  <p:extLst>
+    <p:ext uri="{EFAFB233-063F-42B5-8137-9DF3F51BA10A}">
+      <p15:sldGuideLst xmlns:p15="http://schemas.microsoft.com/office/powerpoint/2012/main"/>
+    </p:ext>
+  </p:extLst>
 </p:presentation>
 </file>
 
@@ -691,6 +699,254 @@
 </p:notes>
 </file>
 
+<file path=ppt/notesSlides/notesSlide10.xml><?xml version="1.0" encoding="utf-8"?>
+<p:notes xmlns:a="http://schemas.openxmlformats.org/drawingml/2006/main" xmlns:r="http://schemas.openxmlformats.org/officeDocument/2006/relationships" xmlns:p="http://schemas.openxmlformats.org/presentationml/2006/main">
+  <p:cSld>
+    <p:spTree>
+      <p:nvGrpSpPr>
+        <p:cNvPr id="1" name=""/>
+        <p:cNvGrpSpPr/>
+        <p:nvPr/>
+      </p:nvGrpSpPr>
+      <p:grpSpPr>
+        <a:xfrm>
+          <a:off x="0" y="0"/>
+          <a:ext cx="0" cy="0"/>
+          <a:chOff x="0" y="0"/>
+          <a:chExt cx="0" cy="0"/>
+        </a:xfrm>
+      </p:grpSpPr>
+      <p:sp>
+        <p:nvSpPr>
+          <p:cNvPr id="2" name="Slide Image Placeholder 1"/>
+          <p:cNvSpPr>
+            <a:spLocks noGrp="1" noRot="1" noChangeAspect="1"/>
+          </p:cNvSpPr>
+          <p:nvPr>
+            <p:ph type="sldImg"/>
+          </p:nvPr>
+        </p:nvSpPr>
+        <p:spPr/>
+      </p:sp>
+      <p:sp>
+        <p:nvSpPr>
+          <p:cNvPr id="3" name="Notes Placeholder 2"/>
+          <p:cNvSpPr>
+            <a:spLocks noGrp="1"/>
+          </p:cNvSpPr>
+          <p:nvPr>
+            <p:ph type="body" idx="1"/>
+          </p:nvPr>
+        </p:nvSpPr>
+        <p:spPr/>
+        <p:txBody>
+          <a:bodyPr/>
+          <a:lstStyle/>
+          <a:p>
+            <a:pPr marL="0" marR="0" lvl="0" indent="0" algn="l" defTabSz="914400" rtl="0" eaLnBrk="1" fontAlgn="auto" latinLnBrk="0" hangingPunct="1">
+              <a:lnSpc>
+                <a:spcPct val="100000"/>
+              </a:lnSpc>
+              <a:spcBef>
+                <a:spcPts val="0"/>
+              </a:spcBef>
+              <a:spcAft>
+                <a:spcPts val="0"/>
+              </a:spcAft>
+              <a:buClrTx/>
+              <a:buSzTx/>
+              <a:buFontTx/>
+              <a:buNone/>
+              <a:tabLst/>
+              <a:defRPr/>
+            </a:pPr>
+            <a:endParaRPr lang="en-US" dirty="0"/>
+          </a:p>
+          <a:p>
+            <a:pPr marL="0" marR="0" lvl="0" indent="0" algn="l" defTabSz="914400" rtl="0" eaLnBrk="1" fontAlgn="auto" latinLnBrk="0" hangingPunct="1">
+              <a:lnSpc>
+                <a:spcPct val="100000"/>
+              </a:lnSpc>
+              <a:spcBef>
+                <a:spcPts val="0"/>
+              </a:spcBef>
+              <a:spcAft>
+                <a:spcPts val="0"/>
+              </a:spcAft>
+              <a:buClrTx/>
+              <a:buSzTx/>
+              <a:buFontTx/>
+              <a:buNone/>
+              <a:tabLst/>
+              <a:defRPr/>
+            </a:pPr>
+            <a:endParaRPr lang="en-US" dirty="0"/>
+          </a:p>
+          <a:p>
+            <a:endParaRPr lang="en-US" dirty="0"/>
+          </a:p>
+        </p:txBody>
+      </p:sp>
+      <p:sp>
+        <p:nvSpPr>
+          <p:cNvPr id="4" name="Slide Number Placeholder 3"/>
+          <p:cNvSpPr>
+            <a:spLocks noGrp="1"/>
+          </p:cNvSpPr>
+          <p:nvPr>
+            <p:ph type="sldNum" sz="quarter" idx="10"/>
+          </p:nvPr>
+        </p:nvSpPr>
+        <p:spPr/>
+        <p:txBody>
+          <a:bodyPr/>
+          <a:lstStyle/>
+          <a:p>
+            <a:fld id="{1126CB3B-D1DC-2A41-8A51-D0D29F2EE3CC}" type="slidenum">
+              <a:rPr lang="en-US" smtClean="0"/>
+              <a:t>13</a:t>
+            </a:fld>
+            <a:endParaRPr lang="en-US"/>
+          </a:p>
+        </p:txBody>
+      </p:sp>
+    </p:spTree>
+    <p:extLst>
+      <p:ext uri="{BB962C8B-B14F-4D97-AF65-F5344CB8AC3E}">
+        <p14:creationId xmlns:p14="http://schemas.microsoft.com/office/powerpoint/2010/main" val="732237335"/>
+      </p:ext>
+    </p:extLst>
+  </p:cSld>
+  <p:clrMapOvr>
+    <a:masterClrMapping/>
+  </p:clrMapOvr>
+</p:notes>
+</file>
+
+<file path=ppt/notesSlides/notesSlide11.xml><?xml version="1.0" encoding="utf-8"?>
+<p:notes xmlns:a="http://schemas.openxmlformats.org/drawingml/2006/main" xmlns:r="http://schemas.openxmlformats.org/officeDocument/2006/relationships" xmlns:p="http://schemas.openxmlformats.org/presentationml/2006/main">
+  <p:cSld>
+    <p:spTree>
+      <p:nvGrpSpPr>
+        <p:cNvPr id="1" name=""/>
+        <p:cNvGrpSpPr/>
+        <p:nvPr/>
+      </p:nvGrpSpPr>
+      <p:grpSpPr>
+        <a:xfrm>
+          <a:off x="0" y="0"/>
+          <a:ext cx="0" cy="0"/>
+          <a:chOff x="0" y="0"/>
+          <a:chExt cx="0" cy="0"/>
+        </a:xfrm>
+      </p:grpSpPr>
+      <p:sp>
+        <p:nvSpPr>
+          <p:cNvPr id="2" name="Slide Image Placeholder 1"/>
+          <p:cNvSpPr>
+            <a:spLocks noGrp="1" noRot="1" noChangeAspect="1"/>
+          </p:cNvSpPr>
+          <p:nvPr>
+            <p:ph type="sldImg"/>
+          </p:nvPr>
+        </p:nvSpPr>
+        <p:spPr/>
+      </p:sp>
+      <p:sp>
+        <p:nvSpPr>
+          <p:cNvPr id="3" name="Notes Placeholder 2"/>
+          <p:cNvSpPr>
+            <a:spLocks noGrp="1"/>
+          </p:cNvSpPr>
+          <p:nvPr>
+            <p:ph type="body" idx="1"/>
+          </p:nvPr>
+        </p:nvSpPr>
+        <p:spPr/>
+        <p:txBody>
+          <a:bodyPr/>
+          <a:lstStyle/>
+          <a:p>
+            <a:pPr marL="0" marR="0" lvl="0" indent="0" algn="l" defTabSz="914400" rtl="0" eaLnBrk="1" fontAlgn="auto" latinLnBrk="0" hangingPunct="1">
+              <a:lnSpc>
+                <a:spcPct val="100000"/>
+              </a:lnSpc>
+              <a:spcBef>
+                <a:spcPts val="0"/>
+              </a:spcBef>
+              <a:spcAft>
+                <a:spcPts val="0"/>
+              </a:spcAft>
+              <a:buClrTx/>
+              <a:buSzTx/>
+              <a:buFontTx/>
+              <a:buNone/>
+              <a:tabLst/>
+              <a:defRPr/>
+            </a:pPr>
+            <a:endParaRPr lang="en-US" dirty="0"/>
+          </a:p>
+          <a:p>
+            <a:pPr marL="0" marR="0" lvl="0" indent="0" algn="l" defTabSz="914400" rtl="0" eaLnBrk="1" fontAlgn="auto" latinLnBrk="0" hangingPunct="1">
+              <a:lnSpc>
+                <a:spcPct val="100000"/>
+              </a:lnSpc>
+              <a:spcBef>
+                <a:spcPts val="0"/>
+              </a:spcBef>
+              <a:spcAft>
+                <a:spcPts val="0"/>
+              </a:spcAft>
+              <a:buClrTx/>
+              <a:buSzTx/>
+              <a:buFontTx/>
+              <a:buNone/>
+              <a:tabLst/>
+              <a:defRPr/>
+            </a:pPr>
+            <a:endParaRPr lang="en-US" dirty="0"/>
+          </a:p>
+          <a:p>
+            <a:endParaRPr lang="en-US" dirty="0"/>
+          </a:p>
+        </p:txBody>
+      </p:sp>
+      <p:sp>
+        <p:nvSpPr>
+          <p:cNvPr id="4" name="Slide Number Placeholder 3"/>
+          <p:cNvSpPr>
+            <a:spLocks noGrp="1"/>
+          </p:cNvSpPr>
+          <p:nvPr>
+            <p:ph type="sldNum" sz="quarter" idx="10"/>
+          </p:nvPr>
+        </p:nvSpPr>
+        <p:spPr/>
+        <p:txBody>
+          <a:bodyPr/>
+          <a:lstStyle/>
+          <a:p>
+            <a:fld id="{1126CB3B-D1DC-2A41-8A51-D0D29F2EE3CC}" type="slidenum">
+              <a:rPr lang="en-US" smtClean="0"/>
+              <a:t>14</a:t>
+            </a:fld>
+            <a:endParaRPr lang="en-US"/>
+          </a:p>
+        </p:txBody>
+      </p:sp>
+    </p:spTree>
+    <p:extLst>
+      <p:ext uri="{BB962C8B-B14F-4D97-AF65-F5344CB8AC3E}">
+        <p14:creationId xmlns:p14="http://schemas.microsoft.com/office/powerpoint/2010/main" val="3757589846"/>
+      </p:ext>
+    </p:extLst>
+  </p:cSld>
+  <p:clrMapOvr>
+    <a:masterClrMapping/>
+  </p:clrMapOvr>
+</p:notes>
+</file>
+
 <file path=ppt/notesSlides/notesSlide2.xml><?xml version="1.0" encoding="utf-8"?>
 <p:notes xmlns:a="http://schemas.openxmlformats.org/drawingml/2006/main" xmlns:r="http://schemas.openxmlformats.org/officeDocument/2006/relationships" xmlns:p="http://schemas.openxmlformats.org/presentationml/2006/main">
   <p:cSld>
@@ -1549,7 +1805,131 @@
     </p:spTree>
     <p:extLst>
       <p:ext uri="{BB962C8B-B14F-4D97-AF65-F5344CB8AC3E}">
-        <p14:creationId xmlns:p14="http://schemas.microsoft.com/office/powerpoint/2010/main" val="3757589846"/>
+        <p14:creationId xmlns:p14="http://schemas.microsoft.com/office/powerpoint/2010/main" val="547500135"/>
+      </p:ext>
+    </p:extLst>
+  </p:cSld>
+  <p:clrMapOvr>
+    <a:masterClrMapping/>
+  </p:clrMapOvr>
+</p:notes>
+</file>
+
+<file path=ppt/notesSlides/notesSlide9.xml><?xml version="1.0" encoding="utf-8"?>
+<p:notes xmlns:a="http://schemas.openxmlformats.org/drawingml/2006/main" xmlns:r="http://schemas.openxmlformats.org/officeDocument/2006/relationships" xmlns:p="http://schemas.openxmlformats.org/presentationml/2006/main">
+  <p:cSld>
+    <p:spTree>
+      <p:nvGrpSpPr>
+        <p:cNvPr id="1" name=""/>
+        <p:cNvGrpSpPr/>
+        <p:nvPr/>
+      </p:nvGrpSpPr>
+      <p:grpSpPr>
+        <a:xfrm>
+          <a:off x="0" y="0"/>
+          <a:ext cx="0" cy="0"/>
+          <a:chOff x="0" y="0"/>
+          <a:chExt cx="0" cy="0"/>
+        </a:xfrm>
+      </p:grpSpPr>
+      <p:sp>
+        <p:nvSpPr>
+          <p:cNvPr id="2" name="Slide Image Placeholder 1"/>
+          <p:cNvSpPr>
+            <a:spLocks noGrp="1" noRot="1" noChangeAspect="1"/>
+          </p:cNvSpPr>
+          <p:nvPr>
+            <p:ph type="sldImg"/>
+          </p:nvPr>
+        </p:nvSpPr>
+        <p:spPr/>
+      </p:sp>
+      <p:sp>
+        <p:nvSpPr>
+          <p:cNvPr id="3" name="Notes Placeholder 2"/>
+          <p:cNvSpPr>
+            <a:spLocks noGrp="1"/>
+          </p:cNvSpPr>
+          <p:nvPr>
+            <p:ph type="body" idx="1"/>
+          </p:nvPr>
+        </p:nvSpPr>
+        <p:spPr/>
+        <p:txBody>
+          <a:bodyPr/>
+          <a:lstStyle/>
+          <a:p>
+            <a:pPr marL="0" marR="0" lvl="0" indent="0" algn="l" defTabSz="914400" rtl="0" eaLnBrk="1" fontAlgn="auto" latinLnBrk="0" hangingPunct="1">
+              <a:lnSpc>
+                <a:spcPct val="100000"/>
+              </a:lnSpc>
+              <a:spcBef>
+                <a:spcPts val="0"/>
+              </a:spcBef>
+              <a:spcAft>
+                <a:spcPts val="0"/>
+              </a:spcAft>
+              <a:buClrTx/>
+              <a:buSzTx/>
+              <a:buFontTx/>
+              <a:buNone/>
+              <a:tabLst/>
+              <a:defRPr/>
+            </a:pPr>
+            <a:endParaRPr lang="en-US" dirty="0"/>
+          </a:p>
+          <a:p>
+            <a:pPr marL="0" marR="0" lvl="0" indent="0" algn="l" defTabSz="914400" rtl="0" eaLnBrk="1" fontAlgn="auto" latinLnBrk="0" hangingPunct="1">
+              <a:lnSpc>
+                <a:spcPct val="100000"/>
+              </a:lnSpc>
+              <a:spcBef>
+                <a:spcPts val="0"/>
+              </a:spcBef>
+              <a:spcAft>
+                <a:spcPts val="0"/>
+              </a:spcAft>
+              <a:buClrTx/>
+              <a:buSzTx/>
+              <a:buFontTx/>
+              <a:buNone/>
+              <a:tabLst/>
+              <a:defRPr/>
+            </a:pPr>
+            <a:endParaRPr lang="en-US" dirty="0"/>
+          </a:p>
+          <a:p>
+            <a:endParaRPr lang="en-US" dirty="0"/>
+          </a:p>
+        </p:txBody>
+      </p:sp>
+      <p:sp>
+        <p:nvSpPr>
+          <p:cNvPr id="4" name="Slide Number Placeholder 3"/>
+          <p:cNvSpPr>
+            <a:spLocks noGrp="1"/>
+          </p:cNvSpPr>
+          <p:nvPr>
+            <p:ph type="sldNum" sz="quarter" idx="10"/>
+          </p:nvPr>
+        </p:nvSpPr>
+        <p:spPr/>
+        <p:txBody>
+          <a:bodyPr/>
+          <a:lstStyle/>
+          <a:p>
+            <a:fld id="{1126CB3B-D1DC-2A41-8A51-D0D29F2EE3CC}" type="slidenum">
+              <a:rPr lang="en-US" smtClean="0"/>
+              <a:t>12</a:t>
+            </a:fld>
+            <a:endParaRPr lang="en-US"/>
+          </a:p>
+        </p:txBody>
+      </p:sp>
+    </p:spTree>
+    <p:extLst>
+      <p:ext uri="{BB962C8B-B14F-4D97-AF65-F5344CB8AC3E}">
+        <p14:creationId xmlns:p14="http://schemas.microsoft.com/office/powerpoint/2010/main" val="3462234530"/>
       </p:ext>
     </p:extLst>
   </p:cSld>
@@ -5219,7 +5599,15 @@
           <a:p>
             <a:r>
               <a:rPr lang="nl-NL" dirty="0"/>
-              <a:t>Extra: mockups, Firebase</a:t>
+              <a:t>Extra: mockups, Firebase, applicatie </a:t>
+            </a:r>
+            <a:r>
+              <a:rPr lang="nl-NL" dirty="0" err="1"/>
+              <a:t>flows</a:t>
+            </a:r>
+            <a:r>
+              <a:rPr lang="nl-NL" dirty="0"/>
+              <a:t> (registratie, encryptie, decryptie)</a:t>
             </a:r>
           </a:p>
           <a:p>
@@ -5333,6 +5721,273 @@
 </file>
 
 <file path=ppt/slides/slide11.xml><?xml version="1.0" encoding="utf-8"?>
+<p:sld xmlns:a="http://schemas.openxmlformats.org/drawingml/2006/main" xmlns:r="http://schemas.openxmlformats.org/officeDocument/2006/relationships" xmlns:p="http://schemas.openxmlformats.org/presentationml/2006/main">
+  <p:cSld>
+    <p:spTree>
+      <p:nvGrpSpPr>
+        <p:cNvPr id="1" name=""/>
+        <p:cNvGrpSpPr/>
+        <p:nvPr/>
+      </p:nvGrpSpPr>
+      <p:grpSpPr>
+        <a:xfrm>
+          <a:off x="0" y="0"/>
+          <a:ext cx="0" cy="0"/>
+          <a:chOff x="0" y="0"/>
+          <a:chExt cx="0" cy="0"/>
+        </a:xfrm>
+      </p:grpSpPr>
+      <p:sp>
+        <p:nvSpPr>
+          <p:cNvPr id="4" name="Title 3">
+            <a:extLst>
+              <a:ext uri="{FF2B5EF4-FFF2-40B4-BE49-F238E27FC236}">
+                <a16:creationId xmlns:a16="http://schemas.microsoft.com/office/drawing/2014/main" id="{571A4FE8-C6B9-5548-956A-923A3A15725E}"/>
+              </a:ext>
+            </a:extLst>
+          </p:cNvPr>
+          <p:cNvSpPr>
+            <a:spLocks noGrp="1"/>
+          </p:cNvSpPr>
+          <p:nvPr>
+            <p:ph type="title"/>
+          </p:nvPr>
+        </p:nvSpPr>
+        <p:spPr/>
+        <p:txBody>
+          <a:bodyPr/>
+          <a:lstStyle/>
+          <a:p>
+            <a:r>
+              <a:rPr lang="nl-NL" dirty="0"/>
+              <a:t>Extra: flow - registratie</a:t>
+            </a:r>
+            <a:endParaRPr lang="en-US" dirty="0"/>
+          </a:p>
+        </p:txBody>
+      </p:sp>
+      <p:pic>
+        <p:nvPicPr>
+          <p:cNvPr id="3" name="Picture 2">
+            <a:extLst>
+              <a:ext uri="{FF2B5EF4-FFF2-40B4-BE49-F238E27FC236}">
+                <a16:creationId xmlns:a16="http://schemas.microsoft.com/office/drawing/2014/main" id="{AFF31927-E53F-1E41-8F64-735072E5EB8E}"/>
+              </a:ext>
+            </a:extLst>
+          </p:cNvPr>
+          <p:cNvPicPr>
+            <a:picLocks noChangeAspect="1"/>
+          </p:cNvPicPr>
+          <p:nvPr/>
+        </p:nvPicPr>
+        <p:blipFill>
+          <a:blip r:embed="rId3"/>
+          <a:stretch>
+            <a:fillRect/>
+          </a:stretch>
+        </p:blipFill>
+        <p:spPr>
+          <a:xfrm>
+            <a:off x="2114635" y="2279704"/>
+            <a:ext cx="7962730" cy="4315933"/>
+          </a:xfrm>
+          <a:prstGeom prst="rect">
+            <a:avLst/>
+          </a:prstGeom>
+        </p:spPr>
+      </p:pic>
+    </p:spTree>
+    <p:extLst>
+      <p:ext uri="{BB962C8B-B14F-4D97-AF65-F5344CB8AC3E}">
+        <p14:creationId xmlns:p14="http://schemas.microsoft.com/office/powerpoint/2010/main" val="1990522108"/>
+      </p:ext>
+    </p:extLst>
+  </p:cSld>
+  <p:clrMapOvr>
+    <a:masterClrMapping/>
+  </p:clrMapOvr>
+</p:sld>
+</file>
+
+<file path=ppt/slides/slide12.xml><?xml version="1.0" encoding="utf-8"?>
+<p:sld xmlns:a="http://schemas.openxmlformats.org/drawingml/2006/main" xmlns:r="http://schemas.openxmlformats.org/officeDocument/2006/relationships" xmlns:p="http://schemas.openxmlformats.org/presentationml/2006/main">
+  <p:cSld>
+    <p:spTree>
+      <p:nvGrpSpPr>
+        <p:cNvPr id="1" name=""/>
+        <p:cNvGrpSpPr/>
+        <p:nvPr/>
+      </p:nvGrpSpPr>
+      <p:grpSpPr>
+        <a:xfrm>
+          <a:off x="0" y="0"/>
+          <a:ext cx="0" cy="0"/>
+          <a:chOff x="0" y="0"/>
+          <a:chExt cx="0" cy="0"/>
+        </a:xfrm>
+      </p:grpSpPr>
+      <p:sp>
+        <p:nvSpPr>
+          <p:cNvPr id="4" name="Title 3">
+            <a:extLst>
+              <a:ext uri="{FF2B5EF4-FFF2-40B4-BE49-F238E27FC236}">
+                <a16:creationId xmlns:a16="http://schemas.microsoft.com/office/drawing/2014/main" id="{571A4FE8-C6B9-5548-956A-923A3A15725E}"/>
+              </a:ext>
+            </a:extLst>
+          </p:cNvPr>
+          <p:cNvSpPr>
+            <a:spLocks noGrp="1"/>
+          </p:cNvSpPr>
+          <p:nvPr>
+            <p:ph type="title"/>
+          </p:nvPr>
+        </p:nvSpPr>
+        <p:spPr/>
+        <p:txBody>
+          <a:bodyPr/>
+          <a:lstStyle/>
+          <a:p>
+            <a:r>
+              <a:rPr lang="nl-NL" dirty="0"/>
+              <a:t>Extra: flow - encryptie</a:t>
+            </a:r>
+            <a:endParaRPr lang="en-US" dirty="0"/>
+          </a:p>
+        </p:txBody>
+      </p:sp>
+      <p:pic>
+        <p:nvPicPr>
+          <p:cNvPr id="7" name="Picture 6">
+            <a:extLst>
+              <a:ext uri="{FF2B5EF4-FFF2-40B4-BE49-F238E27FC236}">
+                <a16:creationId xmlns:a16="http://schemas.microsoft.com/office/drawing/2014/main" id="{5A788CB9-B2F3-704D-BEC9-D57A1CB67157}"/>
+              </a:ext>
+            </a:extLst>
+          </p:cNvPr>
+          <p:cNvPicPr>
+            <a:picLocks noChangeAspect="1"/>
+          </p:cNvPicPr>
+          <p:nvPr/>
+        </p:nvPicPr>
+        <p:blipFill>
+          <a:blip r:embed="rId3"/>
+          <a:stretch>
+            <a:fillRect/>
+          </a:stretch>
+        </p:blipFill>
+        <p:spPr>
+          <a:xfrm>
+            <a:off x="1947333" y="2244182"/>
+            <a:ext cx="8297333" cy="4338199"/>
+          </a:xfrm>
+          <a:prstGeom prst="rect">
+            <a:avLst/>
+          </a:prstGeom>
+        </p:spPr>
+      </p:pic>
+    </p:spTree>
+    <p:extLst>
+      <p:ext uri="{BB962C8B-B14F-4D97-AF65-F5344CB8AC3E}">
+        <p14:creationId xmlns:p14="http://schemas.microsoft.com/office/powerpoint/2010/main" val="3480152968"/>
+      </p:ext>
+    </p:extLst>
+  </p:cSld>
+  <p:clrMapOvr>
+    <a:masterClrMapping/>
+  </p:clrMapOvr>
+</p:sld>
+</file>
+
+<file path=ppt/slides/slide13.xml><?xml version="1.0" encoding="utf-8"?>
+<p:sld xmlns:a="http://schemas.openxmlformats.org/drawingml/2006/main" xmlns:r="http://schemas.openxmlformats.org/officeDocument/2006/relationships" xmlns:p="http://schemas.openxmlformats.org/presentationml/2006/main">
+  <p:cSld>
+    <p:spTree>
+      <p:nvGrpSpPr>
+        <p:cNvPr id="1" name=""/>
+        <p:cNvGrpSpPr/>
+        <p:nvPr/>
+      </p:nvGrpSpPr>
+      <p:grpSpPr>
+        <a:xfrm>
+          <a:off x="0" y="0"/>
+          <a:ext cx="0" cy="0"/>
+          <a:chOff x="0" y="0"/>
+          <a:chExt cx="0" cy="0"/>
+        </a:xfrm>
+      </p:grpSpPr>
+      <p:sp>
+        <p:nvSpPr>
+          <p:cNvPr id="4" name="Title 3">
+            <a:extLst>
+              <a:ext uri="{FF2B5EF4-FFF2-40B4-BE49-F238E27FC236}">
+                <a16:creationId xmlns:a16="http://schemas.microsoft.com/office/drawing/2014/main" id="{571A4FE8-C6B9-5548-956A-923A3A15725E}"/>
+              </a:ext>
+            </a:extLst>
+          </p:cNvPr>
+          <p:cNvSpPr>
+            <a:spLocks noGrp="1"/>
+          </p:cNvSpPr>
+          <p:nvPr>
+            <p:ph type="title"/>
+          </p:nvPr>
+        </p:nvSpPr>
+        <p:spPr/>
+        <p:txBody>
+          <a:bodyPr/>
+          <a:lstStyle/>
+          <a:p>
+            <a:r>
+              <a:rPr lang="nl-NL" dirty="0"/>
+              <a:t>Extra: flow - decryptie</a:t>
+            </a:r>
+            <a:endParaRPr lang="en-US" dirty="0"/>
+          </a:p>
+        </p:txBody>
+      </p:sp>
+      <p:pic>
+        <p:nvPicPr>
+          <p:cNvPr id="3" name="Picture 2">
+            <a:extLst>
+              <a:ext uri="{FF2B5EF4-FFF2-40B4-BE49-F238E27FC236}">
+                <a16:creationId xmlns:a16="http://schemas.microsoft.com/office/drawing/2014/main" id="{019C1A5A-3CAD-4D41-B6A1-E1CD89C06B20}"/>
+              </a:ext>
+            </a:extLst>
+          </p:cNvPr>
+          <p:cNvPicPr>
+            <a:picLocks noChangeAspect="1"/>
+          </p:cNvPicPr>
+          <p:nvPr/>
+        </p:nvPicPr>
+        <p:blipFill>
+          <a:blip r:embed="rId3"/>
+          <a:stretch>
+            <a:fillRect/>
+          </a:stretch>
+        </p:blipFill>
+        <p:spPr>
+          <a:xfrm>
+            <a:off x="1919111" y="2242698"/>
+            <a:ext cx="8353778" cy="4514624"/>
+          </a:xfrm>
+          <a:prstGeom prst="rect">
+            <a:avLst/>
+          </a:prstGeom>
+        </p:spPr>
+      </p:pic>
+    </p:spTree>
+    <p:extLst>
+      <p:ext uri="{BB962C8B-B14F-4D97-AF65-F5344CB8AC3E}">
+        <p14:creationId xmlns:p14="http://schemas.microsoft.com/office/powerpoint/2010/main" val="1725192544"/>
+      </p:ext>
+    </p:extLst>
+  </p:cSld>
+  <p:clrMapOvr>
+    <a:masterClrMapping/>
+  </p:clrMapOvr>
+</p:sld>
+</file>
+
+<file path=ppt/slides/slide14.xml><?xml version="1.0" encoding="utf-8"?>
 <p:sld xmlns:a="http://schemas.openxmlformats.org/drawingml/2006/main" xmlns:r="http://schemas.openxmlformats.org/officeDocument/2006/relationships" xmlns:p="http://schemas.openxmlformats.org/presentationml/2006/main">
   <p:cSld>
     <p:spTree>
@@ -6247,7 +6902,7 @@
             </a:pPr>
             <a:r>
               <a:rPr lang="nl-NL" dirty="0"/>
-              <a:t>Assumptie: file moet geëncrypteerd zijn al vanaf de browser van user A en tot browser van user B</a:t>
+              <a:t>Assumptie: file moet al geëncrypteerd zijn vanaf de browser van user A en tot browser van user B</a:t>
             </a:r>
           </a:p>
           <a:p>
@@ -6370,13 +7025,13 @@
         <p:spPr/>
         <p:txBody>
           <a:bodyPr>
-            <a:normAutofit fontScale="92500"/>
+            <a:normAutofit fontScale="92500" lnSpcReduction="20000"/>
           </a:bodyPr>
           <a:lstStyle/>
           <a:p>
             <a:r>
               <a:rPr lang="nl-NL" sz="2400" dirty="0"/>
-              <a:t>En- decryptie gebeurt in de browser</a:t>
+              <a:t>Encryptie en decryptie gebeurt in de browser</a:t>
             </a:r>
           </a:p>
           <a:p>
@@ -6394,7 +7049,7 @@
           <a:p>
             <a:r>
               <a:rPr lang="nl-NL" sz="2400" dirty="0"/>
-              <a:t>File veilig opslagen op de server</a:t>
+              <a:t>File veilig opslaan op de server</a:t>
             </a:r>
           </a:p>
           <a:p>
@@ -6464,7 +7119,7 @@
         <p:spPr/>
         <p:txBody>
           <a:bodyPr>
-            <a:normAutofit fontScale="92500"/>
+            <a:normAutofit fontScale="92500" lnSpcReduction="20000"/>
           </a:bodyPr>
           <a:lstStyle/>
           <a:p>
@@ -6472,6 +7127,10 @@
               <a:rPr lang="en-US" sz="2400" dirty="0"/>
               <a:t>HTML/ Javascript</a:t>
             </a:r>
+            <a:br>
+              <a:rPr lang="en-US" sz="2400" dirty="0"/>
+            </a:br>
+            <a:endParaRPr lang="en-US" sz="2400" dirty="0"/>
           </a:p>
           <a:p>
             <a:r>

</xml_diff>